<commit_message>
Put in some notes
So read this bad larry
</commit_message>
<xml_diff>
--- a/Smart Nose Surgery - Sprint 2 Demo.pptx
+++ b/Smart Nose Surgery - Sprint 2 Demo.pptx
@@ -269,6 +269,11 @@
       </a:defRPr>
     </a:lvl9pPr>
   </p:defaultTextStyle>
+  <p:extLst>
+    <p:ext uri="{EFAFB233-063F-42B5-8137-9DF3F51BA10A}">
+      <p15:sldGuideLst xmlns:p15="http://schemas.microsoft.com/office/powerpoint/2012/main"/>
+    </p:ext>
+  </p:extLst>
 </p:presentation>
 </file>
 
@@ -1117,7 +1122,11 @@
               </a:spcAft>
               <a:buNone/>
             </a:pPr>
-            <a:endParaRPr/>
+            <a:r>
+              <a:rPr lang="en-US" dirty="0"/>
+              <a:t>I’ll talk through points one and two</a:t>
+            </a:r>
+            <a:endParaRPr dirty="0"/>
           </a:p>
         </p:txBody>
       </p:sp>
@@ -1553,7 +1562,11 @@
               </a:spcAft>
               <a:buNone/>
             </a:pPr>
-            <a:endParaRPr/>
+            <a:r>
+              <a:rPr lang="en-US" dirty="0"/>
+              <a:t>Chris and Victoria talk here</a:t>
+            </a:r>
+            <a:endParaRPr dirty="0"/>
           </a:p>
         </p:txBody>
       </p:sp>
@@ -45940,7 +45953,23 @@
                   <a:schemeClr val="bg1"/>
                 </a:solidFill>
               </a:rPr>
-              <a:t>App will extract facial features, calculate golden ratios for width and height</a:t>
+              <a:t>App will extract facial features using </a:t>
+            </a:r>
+            <a:r>
+              <a:rPr lang="en-US" sz="2000" dirty="0" err="1">
+                <a:solidFill>
+                  <a:schemeClr val="bg1"/>
+                </a:solidFill>
+              </a:rPr>
+              <a:t>dlib</a:t>
+            </a:r>
+            <a:r>
+              <a:rPr lang="en-US" sz="2000" dirty="0">
+                <a:solidFill>
+                  <a:schemeClr val="bg1"/>
+                </a:solidFill>
+              </a:rPr>
+              <a:t> library, calculate golden ratios for width and height</a:t>
             </a:r>
           </a:p>
           <a:p>

</xml_diff>